<commit_message>
Add deeper and figures
</commit_message>
<xml_diff>
--- a/figures/combine_figures.pptx
+++ b/figures/combine_figures.pptx
@@ -5,8 +5,18 @@
     <p:sldMasterId id="2147483648" r:id="rId1"/>
   </p:sldMasterIdLst>
   <p:sldIdLst>
-    <p:sldId id="256" r:id="rId2"/>
-    <p:sldId id="257" r:id="rId3"/>
+    <p:sldId id="260" r:id="rId2"/>
+    <p:sldId id="263" r:id="rId3"/>
+    <p:sldId id="269" r:id="rId4"/>
+    <p:sldId id="264" r:id="rId5"/>
+    <p:sldId id="265" r:id="rId6"/>
+    <p:sldId id="258" r:id="rId7"/>
+    <p:sldId id="266" r:id="rId8"/>
+    <p:sldId id="268" r:id="rId9"/>
+    <p:sldId id="267" r:id="rId10"/>
+    <p:sldId id="259" r:id="rId11"/>
+    <p:sldId id="256" r:id="rId12"/>
+    <p:sldId id="257" r:id="rId13"/>
   </p:sldIdLst>
   <p:sldSz cx="12192000" cy="6858000"/>
   <p:notesSz cx="6858000" cy="9144000"/>
@@ -106,6 +116,38 @@
     </a:lvl9pPr>
   </p:defaultTextStyle>
   <p:extLst>
+    <p:ext uri="{521415D9-36F7-43E2-AB2F-B90AF26B5E84}">
+      <p14:sectionLst xmlns:p14="http://schemas.microsoft.com/office/powerpoint/2010/main">
+        <p14:section name="07.02.2025" id="{C42E8872-3A1D-4F32-95EF-E2E0088B7006}">
+          <p14:sldIdLst>
+            <p14:sldId id="260"/>
+            <p14:sldId id="263"/>
+            <p14:sldId id="269"/>
+            <p14:sldId id="264"/>
+            <p14:sldId id="265"/>
+          </p14:sldIdLst>
+        </p14:section>
+        <p14:section name="07.02.2025 (full resolution)" id="{0BDBE3D1-9EE9-4AAB-9096-30B27F3D3329}">
+          <p14:sldIdLst>
+            <p14:sldId id="258"/>
+            <p14:sldId id="266"/>
+          </p14:sldIdLst>
+        </p14:section>
+        <p14:section name="07.02.2025.deeper" id="{1328ADCC-DCAE-429F-9D22-F1BCDC455054}">
+          <p14:sldIdLst>
+            <p14:sldId id="268"/>
+            <p14:sldId id="267"/>
+          </p14:sldIdLst>
+        </p14:section>
+        <p14:section name="06.02.2025" id="{8BD035CE-BBF1-4F5B-8FF2-E10D38EA4240}">
+          <p14:sldIdLst>
+            <p14:sldId id="259"/>
+            <p14:sldId id="256"/>
+            <p14:sldId id="257"/>
+          </p14:sldIdLst>
+        </p14:section>
+      </p14:sectionLst>
+    </p:ext>
     <p:ext uri="{EFAFB233-063F-42B5-8137-9DF3F51BA10A}">
       <p15:sldGuideLst xmlns:p15="http://schemas.microsoft.com/office/powerpoint/2012/main">
         <p15:guide id="1" orient="horz" pos="2160" userDrawn="1">
@@ -273,7 +315,7 @@
           <a:p>
             <a:fld id="{D707B213-AC1A-41F4-8279-5B7225EC7F93}" type="datetimeFigureOut">
               <a:rPr lang="en-NL" smtClean="0"/>
-              <a:t>06/02/2025</a:t>
+              <a:t>07/02/2025</a:t>
             </a:fld>
             <a:endParaRPr lang="en-NL"/>
           </a:p>
@@ -473,7 +515,7 @@
           <a:p>
             <a:fld id="{D707B213-AC1A-41F4-8279-5B7225EC7F93}" type="datetimeFigureOut">
               <a:rPr lang="en-NL" smtClean="0"/>
-              <a:t>06/02/2025</a:t>
+              <a:t>07/02/2025</a:t>
             </a:fld>
             <a:endParaRPr lang="en-NL"/>
           </a:p>
@@ -683,7 +725,7 @@
           <a:p>
             <a:fld id="{D707B213-AC1A-41F4-8279-5B7225EC7F93}" type="datetimeFigureOut">
               <a:rPr lang="en-NL" smtClean="0"/>
-              <a:t>06/02/2025</a:t>
+              <a:t>07/02/2025</a:t>
             </a:fld>
             <a:endParaRPr lang="en-NL"/>
           </a:p>
@@ -883,7 +925,7 @@
           <a:p>
             <a:fld id="{D707B213-AC1A-41F4-8279-5B7225EC7F93}" type="datetimeFigureOut">
               <a:rPr lang="en-NL" smtClean="0"/>
-              <a:t>06/02/2025</a:t>
+              <a:t>07/02/2025</a:t>
             </a:fld>
             <a:endParaRPr lang="en-NL"/>
           </a:p>
@@ -1159,7 +1201,7 @@
           <a:p>
             <a:fld id="{D707B213-AC1A-41F4-8279-5B7225EC7F93}" type="datetimeFigureOut">
               <a:rPr lang="en-NL" smtClean="0"/>
-              <a:t>06/02/2025</a:t>
+              <a:t>07/02/2025</a:t>
             </a:fld>
             <a:endParaRPr lang="en-NL"/>
           </a:p>
@@ -1427,7 +1469,7 @@
           <a:p>
             <a:fld id="{D707B213-AC1A-41F4-8279-5B7225EC7F93}" type="datetimeFigureOut">
               <a:rPr lang="en-NL" smtClean="0"/>
-              <a:t>06/02/2025</a:t>
+              <a:t>07/02/2025</a:t>
             </a:fld>
             <a:endParaRPr lang="en-NL"/>
           </a:p>
@@ -1842,7 +1884,7 @@
           <a:p>
             <a:fld id="{D707B213-AC1A-41F4-8279-5B7225EC7F93}" type="datetimeFigureOut">
               <a:rPr lang="en-NL" smtClean="0"/>
-              <a:t>06/02/2025</a:t>
+              <a:t>07/02/2025</a:t>
             </a:fld>
             <a:endParaRPr lang="en-NL"/>
           </a:p>
@@ -1984,7 +2026,7 @@
           <a:p>
             <a:fld id="{D707B213-AC1A-41F4-8279-5B7225EC7F93}" type="datetimeFigureOut">
               <a:rPr lang="en-NL" smtClean="0"/>
-              <a:t>06/02/2025</a:t>
+              <a:t>07/02/2025</a:t>
             </a:fld>
             <a:endParaRPr lang="en-NL"/>
           </a:p>
@@ -2097,7 +2139,7 @@
           <a:p>
             <a:fld id="{D707B213-AC1A-41F4-8279-5B7225EC7F93}" type="datetimeFigureOut">
               <a:rPr lang="en-NL" smtClean="0"/>
-              <a:t>06/02/2025</a:t>
+              <a:t>07/02/2025</a:t>
             </a:fld>
             <a:endParaRPr lang="en-NL"/>
           </a:p>
@@ -2410,7 +2452,7 @@
           <a:p>
             <a:fld id="{D707B213-AC1A-41F4-8279-5B7225EC7F93}" type="datetimeFigureOut">
               <a:rPr lang="en-NL" smtClean="0"/>
-              <a:t>06/02/2025</a:t>
+              <a:t>07/02/2025</a:t>
             </a:fld>
             <a:endParaRPr lang="en-NL"/>
           </a:p>
@@ -2699,7 +2741,7 @@
           <a:p>
             <a:fld id="{D707B213-AC1A-41F4-8279-5B7225EC7F93}" type="datetimeFigureOut">
               <a:rPr lang="en-NL" smtClean="0"/>
-              <a:t>06/02/2025</a:t>
+              <a:t>07/02/2025</a:t>
             </a:fld>
             <a:endParaRPr lang="en-NL"/>
           </a:p>
@@ -2942,7 +2984,7 @@
           <a:p>
             <a:fld id="{D707B213-AC1A-41F4-8279-5B7225EC7F93}" type="datetimeFigureOut">
               <a:rPr lang="en-NL" smtClean="0"/>
-              <a:t>06/02/2025</a:t>
+              <a:t>07/02/2025</a:t>
             </a:fld>
             <a:endParaRPr lang="en-NL"/>
           </a:p>
@@ -3359,6 +3401,174 @@
           <a:chExt cx="0" cy="0"/>
         </a:xfrm>
       </p:grpSpPr>
+      <p:sp>
+        <p:nvSpPr>
+          <p:cNvPr id="2" name="Title 1">
+            <a:extLst>
+              <a:ext uri="{FF2B5EF4-FFF2-40B4-BE49-F238E27FC236}">
+                <a16:creationId xmlns:a16="http://schemas.microsoft.com/office/drawing/2014/main" id="{D44E8930-FEDF-CB17-86E2-D053091CFDE0}"/>
+              </a:ext>
+            </a:extLst>
+          </p:cNvPr>
+          <p:cNvSpPr>
+            <a:spLocks noGrp="1"/>
+          </p:cNvSpPr>
+          <p:nvPr>
+            <p:ph type="ctrTitle"/>
+          </p:nvPr>
+        </p:nvSpPr>
+        <p:spPr/>
+        <p:txBody>
+          <a:bodyPr/>
+          <a:lstStyle/>
+          <a:p>
+            <a:r>
+              <a:rPr lang="en-US" dirty="0"/>
+              <a:t>07.02.2025</a:t>
+            </a:r>
+            <a:endParaRPr lang="en-NL" dirty="0"/>
+          </a:p>
+        </p:txBody>
+      </p:sp>
+      <p:sp>
+        <p:nvSpPr>
+          <p:cNvPr id="3" name="Subtitle 2">
+            <a:extLst>
+              <a:ext uri="{FF2B5EF4-FFF2-40B4-BE49-F238E27FC236}">
+                <a16:creationId xmlns:a16="http://schemas.microsoft.com/office/drawing/2014/main" id="{DCA21F71-F350-A6BE-4A2A-D56205D20718}"/>
+              </a:ext>
+            </a:extLst>
+          </p:cNvPr>
+          <p:cNvSpPr>
+            <a:spLocks noGrp="1"/>
+          </p:cNvSpPr>
+          <p:nvPr>
+            <p:ph type="subTitle" idx="1"/>
+          </p:nvPr>
+        </p:nvSpPr>
+        <p:spPr/>
+        <p:txBody>
+          <a:bodyPr/>
+          <a:lstStyle/>
+          <a:p>
+            <a:endParaRPr lang="en-NL"/>
+          </a:p>
+        </p:txBody>
+      </p:sp>
+    </p:spTree>
+    <p:extLst>
+      <p:ext uri="{BB962C8B-B14F-4D97-AF65-F5344CB8AC3E}">
+        <p14:creationId xmlns:p14="http://schemas.microsoft.com/office/powerpoint/2010/main" val="2030134190"/>
+      </p:ext>
+    </p:extLst>
+  </p:cSld>
+  <p:clrMapOvr>
+    <a:masterClrMapping/>
+  </p:clrMapOvr>
+</p:sld>
+</file>
+
+<file path=ppt/slides/slide10.xml><?xml version="1.0" encoding="utf-8"?>
+<p:sld xmlns:a="http://schemas.openxmlformats.org/drawingml/2006/main" xmlns:r="http://schemas.openxmlformats.org/officeDocument/2006/relationships" xmlns:p="http://schemas.openxmlformats.org/presentationml/2006/main">
+  <p:cSld>
+    <p:spTree>
+      <p:nvGrpSpPr>
+        <p:cNvPr id="1" name=""/>
+        <p:cNvGrpSpPr/>
+        <p:nvPr/>
+      </p:nvGrpSpPr>
+      <p:grpSpPr>
+        <a:xfrm>
+          <a:off x="0" y="0"/>
+          <a:ext cx="0" cy="0"/>
+          <a:chOff x="0" y="0"/>
+          <a:chExt cx="0" cy="0"/>
+        </a:xfrm>
+      </p:grpSpPr>
+      <p:sp>
+        <p:nvSpPr>
+          <p:cNvPr id="2" name="Title 1">
+            <a:extLst>
+              <a:ext uri="{FF2B5EF4-FFF2-40B4-BE49-F238E27FC236}">
+                <a16:creationId xmlns:a16="http://schemas.microsoft.com/office/drawing/2014/main" id="{D44E8930-FEDF-CB17-86E2-D053091CFDE0}"/>
+              </a:ext>
+            </a:extLst>
+          </p:cNvPr>
+          <p:cNvSpPr>
+            <a:spLocks noGrp="1"/>
+          </p:cNvSpPr>
+          <p:nvPr>
+            <p:ph type="ctrTitle"/>
+          </p:nvPr>
+        </p:nvSpPr>
+        <p:spPr/>
+        <p:txBody>
+          <a:bodyPr/>
+          <a:lstStyle/>
+          <a:p>
+            <a:r>
+              <a:rPr lang="en-US" dirty="0"/>
+              <a:t>06.02.2025</a:t>
+            </a:r>
+            <a:endParaRPr lang="en-NL" dirty="0"/>
+          </a:p>
+        </p:txBody>
+      </p:sp>
+      <p:sp>
+        <p:nvSpPr>
+          <p:cNvPr id="3" name="Subtitle 2">
+            <a:extLst>
+              <a:ext uri="{FF2B5EF4-FFF2-40B4-BE49-F238E27FC236}">
+                <a16:creationId xmlns:a16="http://schemas.microsoft.com/office/drawing/2014/main" id="{DCA21F71-F350-A6BE-4A2A-D56205D20718}"/>
+              </a:ext>
+            </a:extLst>
+          </p:cNvPr>
+          <p:cNvSpPr>
+            <a:spLocks noGrp="1"/>
+          </p:cNvSpPr>
+          <p:nvPr>
+            <p:ph type="subTitle" idx="1"/>
+          </p:nvPr>
+        </p:nvSpPr>
+        <p:spPr/>
+        <p:txBody>
+          <a:bodyPr/>
+          <a:lstStyle/>
+          <a:p>
+            <a:endParaRPr lang="en-NL"/>
+          </a:p>
+        </p:txBody>
+      </p:sp>
+    </p:spTree>
+    <p:extLst>
+      <p:ext uri="{BB962C8B-B14F-4D97-AF65-F5344CB8AC3E}">
+        <p14:creationId xmlns:p14="http://schemas.microsoft.com/office/powerpoint/2010/main" val="237461951"/>
+      </p:ext>
+    </p:extLst>
+  </p:cSld>
+  <p:clrMapOvr>
+    <a:masterClrMapping/>
+  </p:clrMapOvr>
+</p:sld>
+</file>
+
+<file path=ppt/slides/slide11.xml><?xml version="1.0" encoding="utf-8"?>
+<p:sld xmlns:a="http://schemas.openxmlformats.org/drawingml/2006/main" xmlns:r="http://schemas.openxmlformats.org/officeDocument/2006/relationships" xmlns:p="http://schemas.openxmlformats.org/presentationml/2006/main">
+  <p:cSld>
+    <p:spTree>
+      <p:nvGrpSpPr>
+        <p:cNvPr id="1" name=""/>
+        <p:cNvGrpSpPr/>
+        <p:nvPr/>
+      </p:nvGrpSpPr>
+      <p:grpSpPr>
+        <a:xfrm>
+          <a:off x="0" y="0"/>
+          <a:ext cx="0" cy="0"/>
+          <a:chOff x="0" y="0"/>
+          <a:chExt cx="0" cy="0"/>
+        </a:xfrm>
+      </p:grpSpPr>
       <p:pic>
         <p:nvPicPr>
           <p:cNvPr id="5" name="Picture 4" descr="A graph of a graph with colored lines&#10;&#10;Description automatically generated">
@@ -3470,6 +3680,66 @@
     <p:extLst>
       <p:ext uri="{BB962C8B-B14F-4D97-AF65-F5344CB8AC3E}">
         <p14:creationId xmlns:p14="http://schemas.microsoft.com/office/powerpoint/2010/main" val="4231345656"/>
+      </p:ext>
+    </p:extLst>
+  </p:cSld>
+  <p:clrMapOvr>
+    <a:masterClrMapping/>
+  </p:clrMapOvr>
+</p:sld>
+</file>
+
+<file path=ppt/slides/slide12.xml><?xml version="1.0" encoding="utf-8"?>
+<p:sld xmlns:a="http://schemas.openxmlformats.org/drawingml/2006/main" xmlns:r="http://schemas.openxmlformats.org/officeDocument/2006/relationships" xmlns:p="http://schemas.openxmlformats.org/presentationml/2006/main">
+  <p:cSld>
+    <p:spTree>
+      <p:nvGrpSpPr>
+        <p:cNvPr id="1" name=""/>
+        <p:cNvGrpSpPr/>
+        <p:nvPr/>
+      </p:nvGrpSpPr>
+      <p:grpSpPr>
+        <a:xfrm>
+          <a:off x="0" y="0"/>
+          <a:ext cx="0" cy="0"/>
+          <a:chOff x="0" y="0"/>
+          <a:chExt cx="0" cy="0"/>
+        </a:xfrm>
+      </p:grpSpPr>
+      <p:pic>
+        <p:nvPicPr>
+          <p:cNvPr id="6" name="Picture 5">
+            <a:extLst>
+              <a:ext uri="{FF2B5EF4-FFF2-40B4-BE49-F238E27FC236}">
+                <a16:creationId xmlns:a16="http://schemas.microsoft.com/office/drawing/2014/main" id="{DBE995CB-A5E8-0CCB-7C7A-BA68B98E30B1}"/>
+              </a:ext>
+            </a:extLst>
+          </p:cNvPr>
+          <p:cNvPicPr>
+            <a:picLocks noChangeAspect="1"/>
+          </p:cNvPicPr>
+          <p:nvPr/>
+        </p:nvPicPr>
+        <p:blipFill>
+          <a:blip r:embed="rId2"/>
+          <a:stretch>
+            <a:fillRect/>
+          </a:stretch>
+        </p:blipFill>
+        <p:spPr>
+          <a:xfrm>
+            <a:off x="2667000" y="0"/>
+            <a:ext cx="6858000" cy="6858000"/>
+          </a:xfrm>
+          <a:prstGeom prst="rect">
+            <a:avLst/>
+          </a:prstGeom>
+        </p:spPr>
+      </p:pic>
+    </p:spTree>
+    <p:extLst>
+      <p:ext uri="{BB962C8B-B14F-4D97-AF65-F5344CB8AC3E}">
+        <p14:creationId xmlns:p14="http://schemas.microsoft.com/office/powerpoint/2010/main" val="2427314963"/>
       </p:ext>
     </p:extLst>
   </p:cSld>
@@ -3498,10 +3768,10 @@
       </p:grpSpPr>
       <p:pic>
         <p:nvPicPr>
-          <p:cNvPr id="6" name="Picture 5">
-            <a:extLst>
-              <a:ext uri="{FF2B5EF4-FFF2-40B4-BE49-F238E27FC236}">
-                <a16:creationId xmlns:a16="http://schemas.microsoft.com/office/drawing/2014/main" id="{DBE995CB-A5E8-0CCB-7C7A-BA68B98E30B1}"/>
+          <p:cNvPr id="16" name="Picture 15">
+            <a:extLst>
+              <a:ext uri="{FF2B5EF4-FFF2-40B4-BE49-F238E27FC236}">
+                <a16:creationId xmlns:a16="http://schemas.microsoft.com/office/drawing/2014/main" id="{4B416736-3AFA-0C02-35D8-C85BD26D0168}"/>
               </a:ext>
             </a:extLst>
           </p:cNvPr>
@@ -3518,8 +3788,38 @@
         </p:blipFill>
         <p:spPr>
           <a:xfrm>
-            <a:off x="2667000" y="0"/>
-            <a:ext cx="6858000" cy="6858000"/>
+            <a:off x="0" y="0"/>
+            <a:ext cx="6853357" cy="6858000"/>
+          </a:xfrm>
+          <a:prstGeom prst="rect">
+            <a:avLst/>
+          </a:prstGeom>
+        </p:spPr>
+      </p:pic>
+      <p:pic>
+        <p:nvPicPr>
+          <p:cNvPr id="20" name="Picture 19">
+            <a:extLst>
+              <a:ext uri="{FF2B5EF4-FFF2-40B4-BE49-F238E27FC236}">
+                <a16:creationId xmlns:a16="http://schemas.microsoft.com/office/drawing/2014/main" id="{C953C3E8-B360-59A6-C666-C18F6335CE4D}"/>
+              </a:ext>
+            </a:extLst>
+          </p:cNvPr>
+          <p:cNvPicPr>
+            <a:picLocks noChangeAspect="1"/>
+          </p:cNvPicPr>
+          <p:nvPr/>
+        </p:nvPicPr>
+        <p:blipFill>
+          <a:blip r:embed="rId3"/>
+          <a:stretch>
+            <a:fillRect/>
+          </a:stretch>
+        </p:blipFill>
+        <p:spPr>
+          <a:xfrm>
+            <a:off x="7005099" y="5537406"/>
+            <a:ext cx="4492487" cy="1320594"/>
           </a:xfrm>
           <a:prstGeom prst="rect">
             <a:avLst/>
@@ -3529,7 +3829,759 @@
     </p:spTree>
     <p:extLst>
       <p:ext uri="{BB962C8B-B14F-4D97-AF65-F5344CB8AC3E}">
-        <p14:creationId xmlns:p14="http://schemas.microsoft.com/office/powerpoint/2010/main" val="2427314963"/>
+        <p14:creationId xmlns:p14="http://schemas.microsoft.com/office/powerpoint/2010/main" val="3121377836"/>
+      </p:ext>
+    </p:extLst>
+  </p:cSld>
+  <p:clrMapOvr>
+    <a:masterClrMapping/>
+  </p:clrMapOvr>
+</p:sld>
+</file>
+
+<file path=ppt/slides/slide3.xml><?xml version="1.0" encoding="utf-8"?>
+<p:sld xmlns:a="http://schemas.openxmlformats.org/drawingml/2006/main" xmlns:r="http://schemas.openxmlformats.org/officeDocument/2006/relationships" xmlns:p="http://schemas.openxmlformats.org/presentationml/2006/main">
+  <p:cSld>
+    <p:spTree>
+      <p:nvGrpSpPr>
+        <p:cNvPr id="1" name=""/>
+        <p:cNvGrpSpPr/>
+        <p:nvPr/>
+      </p:nvGrpSpPr>
+      <p:grpSpPr>
+        <a:xfrm>
+          <a:off x="0" y="0"/>
+          <a:ext cx="0" cy="0"/>
+          <a:chOff x="0" y="0"/>
+          <a:chExt cx="0" cy="0"/>
+        </a:xfrm>
+      </p:grpSpPr>
+      <p:pic>
+        <p:nvPicPr>
+          <p:cNvPr id="12" name="Picture 11">
+            <a:extLst>
+              <a:ext uri="{FF2B5EF4-FFF2-40B4-BE49-F238E27FC236}">
+                <a16:creationId xmlns:a16="http://schemas.microsoft.com/office/drawing/2014/main" id="{24315EBD-2644-B7F5-A45B-A4DD6CE95DA9}"/>
+              </a:ext>
+            </a:extLst>
+          </p:cNvPr>
+          <p:cNvPicPr>
+            <a:picLocks noChangeAspect="1"/>
+          </p:cNvPicPr>
+          <p:nvPr/>
+        </p:nvPicPr>
+        <p:blipFill>
+          <a:blip r:embed="rId2"/>
+          <a:stretch>
+            <a:fillRect/>
+          </a:stretch>
+        </p:blipFill>
+        <p:spPr>
+          <a:xfrm>
+            <a:off x="0" y="0"/>
+            <a:ext cx="6853357" cy="6858000"/>
+          </a:xfrm>
+          <a:prstGeom prst="rect">
+            <a:avLst/>
+          </a:prstGeom>
+        </p:spPr>
+      </p:pic>
+      <p:pic>
+        <p:nvPicPr>
+          <p:cNvPr id="18" name="Picture 17">
+            <a:extLst>
+              <a:ext uri="{FF2B5EF4-FFF2-40B4-BE49-F238E27FC236}">
+                <a16:creationId xmlns:a16="http://schemas.microsoft.com/office/drawing/2014/main" id="{9375945F-134A-C1F7-D857-4FF9C3C142FB}"/>
+              </a:ext>
+            </a:extLst>
+          </p:cNvPr>
+          <p:cNvPicPr>
+            <a:picLocks noChangeAspect="1"/>
+          </p:cNvPicPr>
+          <p:nvPr/>
+        </p:nvPicPr>
+        <p:blipFill>
+          <a:blip r:embed="rId3"/>
+          <a:stretch>
+            <a:fillRect/>
+          </a:stretch>
+        </p:blipFill>
+        <p:spPr>
+          <a:xfrm>
+            <a:off x="7005099" y="5537416"/>
+            <a:ext cx="5323605" cy="1320584"/>
+          </a:xfrm>
+          <a:prstGeom prst="rect">
+            <a:avLst/>
+          </a:prstGeom>
+        </p:spPr>
+      </p:pic>
+      <p:sp>
+        <p:nvSpPr>
+          <p:cNvPr id="2" name="TextBox 1">
+            <a:extLst>
+              <a:ext uri="{FF2B5EF4-FFF2-40B4-BE49-F238E27FC236}">
+                <a16:creationId xmlns:a16="http://schemas.microsoft.com/office/drawing/2014/main" id="{B85EB90B-45D9-6161-5BED-B4B6F8CB7270}"/>
+              </a:ext>
+            </a:extLst>
+          </p:cNvPr>
+          <p:cNvSpPr txBox="1"/>
+          <p:nvPr/>
+        </p:nvSpPr>
+        <p:spPr>
+          <a:xfrm>
+            <a:off x="7832035" y="5239910"/>
+            <a:ext cx="1176793" cy="369332"/>
+          </a:xfrm>
+          <a:prstGeom prst="rect">
+            <a:avLst/>
+          </a:prstGeom>
+          <a:noFill/>
+        </p:spPr>
+        <p:txBody>
+          <a:bodyPr wrap="square" rtlCol="0">
+            <a:spAutoFit/>
+          </a:bodyPr>
+          <a:lstStyle/>
+          <a:p>
+            <a:r>
+              <a:rPr lang="en-US" dirty="0"/>
+              <a:t>deeper</a:t>
+            </a:r>
+            <a:endParaRPr lang="en-NL" dirty="0"/>
+          </a:p>
+        </p:txBody>
+      </p:sp>
+    </p:spTree>
+    <p:extLst>
+      <p:ext uri="{BB962C8B-B14F-4D97-AF65-F5344CB8AC3E}">
+        <p14:creationId xmlns:p14="http://schemas.microsoft.com/office/powerpoint/2010/main" val="2464033989"/>
+      </p:ext>
+    </p:extLst>
+  </p:cSld>
+  <p:clrMapOvr>
+    <a:masterClrMapping/>
+  </p:clrMapOvr>
+</p:sld>
+</file>
+
+<file path=ppt/slides/slide4.xml><?xml version="1.0" encoding="utf-8"?>
+<p:sld xmlns:a="http://schemas.openxmlformats.org/drawingml/2006/main" xmlns:r="http://schemas.openxmlformats.org/officeDocument/2006/relationships" xmlns:p="http://schemas.openxmlformats.org/presentationml/2006/main">
+  <p:cSld>
+    <p:spTree>
+      <p:nvGrpSpPr>
+        <p:cNvPr id="1" name=""/>
+        <p:cNvGrpSpPr/>
+        <p:nvPr/>
+      </p:nvGrpSpPr>
+      <p:grpSpPr>
+        <a:xfrm>
+          <a:off x="0" y="0"/>
+          <a:ext cx="0" cy="0"/>
+          <a:chOff x="0" y="0"/>
+          <a:chExt cx="0" cy="0"/>
+        </a:xfrm>
+      </p:grpSpPr>
+      <p:pic>
+        <p:nvPicPr>
+          <p:cNvPr id="13" name="Picture 12">
+            <a:extLst>
+              <a:ext uri="{FF2B5EF4-FFF2-40B4-BE49-F238E27FC236}">
+                <a16:creationId xmlns:a16="http://schemas.microsoft.com/office/drawing/2014/main" id="{72329885-9469-8168-A570-2B5157F03140}"/>
+              </a:ext>
+            </a:extLst>
+          </p:cNvPr>
+          <p:cNvPicPr>
+            <a:picLocks noChangeAspect="1"/>
+          </p:cNvPicPr>
+          <p:nvPr/>
+        </p:nvPicPr>
+        <p:blipFill>
+          <a:blip r:embed="rId2"/>
+          <a:stretch>
+            <a:fillRect/>
+          </a:stretch>
+        </p:blipFill>
+        <p:spPr>
+          <a:xfrm>
+            <a:off x="2664675" y="0"/>
+            <a:ext cx="6862650" cy="6858000"/>
+          </a:xfrm>
+          <a:prstGeom prst="rect">
+            <a:avLst/>
+          </a:prstGeom>
+        </p:spPr>
+      </p:pic>
+    </p:spTree>
+    <p:extLst>
+      <p:ext uri="{BB962C8B-B14F-4D97-AF65-F5344CB8AC3E}">
+        <p14:creationId xmlns:p14="http://schemas.microsoft.com/office/powerpoint/2010/main" val="2602412507"/>
+      </p:ext>
+    </p:extLst>
+  </p:cSld>
+  <p:clrMapOvr>
+    <a:masterClrMapping/>
+  </p:clrMapOvr>
+</p:sld>
+</file>
+
+<file path=ppt/slides/slide5.xml><?xml version="1.0" encoding="utf-8"?>
+<p:sld xmlns:a="http://schemas.openxmlformats.org/drawingml/2006/main" xmlns:r="http://schemas.openxmlformats.org/officeDocument/2006/relationships" xmlns:p="http://schemas.openxmlformats.org/presentationml/2006/main">
+  <p:cSld>
+    <p:spTree>
+      <p:nvGrpSpPr>
+        <p:cNvPr id="1" name=""/>
+        <p:cNvGrpSpPr/>
+        <p:nvPr/>
+      </p:nvGrpSpPr>
+      <p:grpSpPr>
+        <a:xfrm>
+          <a:off x="0" y="0"/>
+          <a:ext cx="0" cy="0"/>
+          <a:chOff x="0" y="0"/>
+          <a:chExt cx="0" cy="0"/>
+        </a:xfrm>
+      </p:grpSpPr>
+      <p:pic>
+        <p:nvPicPr>
+          <p:cNvPr id="7" name="Picture 6">
+            <a:extLst>
+              <a:ext uri="{FF2B5EF4-FFF2-40B4-BE49-F238E27FC236}">
+                <a16:creationId xmlns:a16="http://schemas.microsoft.com/office/drawing/2014/main" id="{0D11B95C-1901-9634-E25D-2F10448FAAB9}"/>
+              </a:ext>
+            </a:extLst>
+          </p:cNvPr>
+          <p:cNvPicPr>
+            <a:picLocks noChangeAspect="1"/>
+          </p:cNvPicPr>
+          <p:nvPr/>
+        </p:nvPicPr>
+        <p:blipFill>
+          <a:blip r:embed="rId2">
+            <a:extLst>
+              <a:ext uri="{28A0092B-C50C-407E-A947-70E740481C1C}">
+                <a14:useLocalDpi xmlns:a14="http://schemas.microsoft.com/office/drawing/2010/main" val="0"/>
+              </a:ext>
+            </a:extLst>
+          </a:blip>
+          <a:srcRect/>
+          <a:stretch/>
+        </p:blipFill>
+        <p:spPr>
+          <a:xfrm>
+            <a:off x="3403512" y="754144"/>
+            <a:ext cx="5130453" cy="5130453"/>
+          </a:xfrm>
+          <a:prstGeom prst="rect">
+            <a:avLst/>
+          </a:prstGeom>
+        </p:spPr>
+      </p:pic>
+    </p:spTree>
+    <p:extLst>
+      <p:ext uri="{BB962C8B-B14F-4D97-AF65-F5344CB8AC3E}">
+        <p14:creationId xmlns:p14="http://schemas.microsoft.com/office/powerpoint/2010/main" val="42310883"/>
+      </p:ext>
+    </p:extLst>
+  </p:cSld>
+  <p:clrMapOvr>
+    <a:masterClrMapping/>
+  </p:clrMapOvr>
+</p:sld>
+</file>
+
+<file path=ppt/slides/slide6.xml><?xml version="1.0" encoding="utf-8"?>
+<p:sld xmlns:a="http://schemas.openxmlformats.org/drawingml/2006/main" xmlns:r="http://schemas.openxmlformats.org/officeDocument/2006/relationships" xmlns:p="http://schemas.openxmlformats.org/presentationml/2006/main">
+  <p:cSld>
+    <p:spTree>
+      <p:nvGrpSpPr>
+        <p:cNvPr id="1" name=""/>
+        <p:cNvGrpSpPr/>
+        <p:nvPr/>
+      </p:nvGrpSpPr>
+      <p:grpSpPr>
+        <a:xfrm>
+          <a:off x="0" y="0"/>
+          <a:ext cx="0" cy="0"/>
+          <a:chOff x="0" y="0"/>
+          <a:chExt cx="0" cy="0"/>
+        </a:xfrm>
+      </p:grpSpPr>
+      <p:pic>
+        <p:nvPicPr>
+          <p:cNvPr id="3" name="Picture 2">
+            <a:extLst>
+              <a:ext uri="{FF2B5EF4-FFF2-40B4-BE49-F238E27FC236}">
+                <a16:creationId xmlns:a16="http://schemas.microsoft.com/office/drawing/2014/main" id="{5C25C47E-A865-A116-9492-374DBAC738E1}"/>
+              </a:ext>
+            </a:extLst>
+          </p:cNvPr>
+          <p:cNvPicPr>
+            <a:picLocks noChangeAspect="1"/>
+          </p:cNvPicPr>
+          <p:nvPr/>
+        </p:nvPicPr>
+        <p:blipFill>
+          <a:blip r:embed="rId2">
+            <a:extLst>
+              <a:ext uri="{28A0092B-C50C-407E-A947-70E740481C1C}">
+                <a14:useLocalDpi xmlns:a14="http://schemas.microsoft.com/office/drawing/2010/main" val="0"/>
+              </a:ext>
+            </a:extLst>
+          </a:blip>
+          <a:srcRect/>
+          <a:stretch/>
+        </p:blipFill>
+        <p:spPr>
+          <a:xfrm>
+            <a:off x="2011922" y="3008371"/>
+            <a:ext cx="8997714" cy="4498857"/>
+          </a:xfrm>
+          <a:prstGeom prst="rect">
+            <a:avLst/>
+          </a:prstGeom>
+        </p:spPr>
+      </p:pic>
+      <p:pic>
+        <p:nvPicPr>
+          <p:cNvPr id="6" name="Picture 5">
+            <a:extLst>
+              <a:ext uri="{FF2B5EF4-FFF2-40B4-BE49-F238E27FC236}">
+                <a16:creationId xmlns:a16="http://schemas.microsoft.com/office/drawing/2014/main" id="{7CA9AA40-C72A-A3CD-EBDA-66778A9564D0}"/>
+              </a:ext>
+            </a:extLst>
+          </p:cNvPr>
+          <p:cNvPicPr>
+            <a:picLocks noChangeAspect="1"/>
+          </p:cNvPicPr>
+          <p:nvPr/>
+        </p:nvPicPr>
+        <p:blipFill>
+          <a:blip r:embed="rId3">
+            <a:extLst>
+              <a:ext uri="{28A0092B-C50C-407E-A947-70E740481C1C}">
+                <a14:useLocalDpi xmlns:a14="http://schemas.microsoft.com/office/drawing/2010/main" val="0"/>
+              </a:ext>
+            </a:extLst>
+          </a:blip>
+          <a:srcRect/>
+          <a:stretch/>
+        </p:blipFill>
+        <p:spPr>
+          <a:xfrm>
+            <a:off x="2011922" y="-1490486"/>
+            <a:ext cx="4498857" cy="4498857"/>
+          </a:xfrm>
+          <a:prstGeom prst="rect">
+            <a:avLst/>
+          </a:prstGeom>
+        </p:spPr>
+      </p:pic>
+      <p:pic>
+        <p:nvPicPr>
+          <p:cNvPr id="9" name="Picture 8">
+            <a:extLst>
+              <a:ext uri="{FF2B5EF4-FFF2-40B4-BE49-F238E27FC236}">
+                <a16:creationId xmlns:a16="http://schemas.microsoft.com/office/drawing/2014/main" id="{BF29CF53-7B7E-62B6-D30B-218FA9FE583D}"/>
+              </a:ext>
+            </a:extLst>
+          </p:cNvPr>
+          <p:cNvPicPr>
+            <a:picLocks noChangeAspect="1"/>
+          </p:cNvPicPr>
+          <p:nvPr/>
+        </p:nvPicPr>
+        <p:blipFill>
+          <a:blip r:embed="rId4">
+            <a:extLst>
+              <a:ext uri="{28A0092B-C50C-407E-A947-70E740481C1C}">
+                <a14:useLocalDpi xmlns:a14="http://schemas.microsoft.com/office/drawing/2010/main" val="0"/>
+              </a:ext>
+            </a:extLst>
+          </a:blip>
+          <a:srcRect/>
+          <a:stretch/>
+        </p:blipFill>
+        <p:spPr>
+          <a:xfrm>
+            <a:off x="6510779" y="-1490486"/>
+            <a:ext cx="4498857" cy="4498857"/>
+          </a:xfrm>
+          <a:prstGeom prst="rect">
+            <a:avLst/>
+          </a:prstGeom>
+        </p:spPr>
+      </p:pic>
+    </p:spTree>
+    <p:extLst>
+      <p:ext uri="{BB962C8B-B14F-4D97-AF65-F5344CB8AC3E}">
+        <p14:creationId xmlns:p14="http://schemas.microsoft.com/office/powerpoint/2010/main" val="2609913372"/>
+      </p:ext>
+    </p:extLst>
+  </p:cSld>
+  <p:clrMapOvr>
+    <a:masterClrMapping/>
+  </p:clrMapOvr>
+</p:sld>
+</file>
+
+<file path=ppt/slides/slide7.xml><?xml version="1.0" encoding="utf-8"?>
+<p:sld xmlns:a="http://schemas.openxmlformats.org/drawingml/2006/main" xmlns:r="http://schemas.openxmlformats.org/officeDocument/2006/relationships" xmlns:p="http://schemas.openxmlformats.org/presentationml/2006/main">
+  <p:cSld>
+    <p:spTree>
+      <p:nvGrpSpPr>
+        <p:cNvPr id="1" name=""/>
+        <p:cNvGrpSpPr/>
+        <p:nvPr/>
+      </p:nvGrpSpPr>
+      <p:grpSpPr>
+        <a:xfrm>
+          <a:off x="0" y="0"/>
+          <a:ext cx="0" cy="0"/>
+          <a:chOff x="0" y="0"/>
+          <a:chExt cx="0" cy="0"/>
+        </a:xfrm>
+      </p:grpSpPr>
+      <p:pic>
+        <p:nvPicPr>
+          <p:cNvPr id="4" name="Picture 3">
+            <a:extLst>
+              <a:ext uri="{FF2B5EF4-FFF2-40B4-BE49-F238E27FC236}">
+                <a16:creationId xmlns:a16="http://schemas.microsoft.com/office/drawing/2014/main" id="{23182811-19D4-D2B4-C5BB-3C0FB84A0DDF}"/>
+              </a:ext>
+            </a:extLst>
+          </p:cNvPr>
+          <p:cNvPicPr>
+            <a:picLocks noChangeAspect="1"/>
+          </p:cNvPicPr>
+          <p:nvPr/>
+        </p:nvPicPr>
+        <p:blipFill>
+          <a:blip r:embed="rId2">
+            <a:extLst>
+              <a:ext uri="{28A0092B-C50C-407E-A947-70E740481C1C}">
+                <a14:useLocalDpi xmlns:a14="http://schemas.microsoft.com/office/drawing/2010/main" val="0"/>
+              </a:ext>
+            </a:extLst>
+          </a:blip>
+          <a:srcRect/>
+          <a:stretch/>
+        </p:blipFill>
+        <p:spPr>
+          <a:xfrm>
+            <a:off x="1017767" y="114096"/>
+            <a:ext cx="4498857" cy="4498857"/>
+          </a:xfrm>
+          <a:prstGeom prst="rect">
+            <a:avLst/>
+          </a:prstGeom>
+        </p:spPr>
+      </p:pic>
+      <p:pic>
+        <p:nvPicPr>
+          <p:cNvPr id="10" name="Picture 9">
+            <a:extLst>
+              <a:ext uri="{FF2B5EF4-FFF2-40B4-BE49-F238E27FC236}">
+                <a16:creationId xmlns:a16="http://schemas.microsoft.com/office/drawing/2014/main" id="{7A288559-AF62-BFDA-EF61-936230B65217}"/>
+              </a:ext>
+            </a:extLst>
+          </p:cNvPr>
+          <p:cNvPicPr>
+            <a:picLocks noChangeAspect="1"/>
+          </p:cNvPicPr>
+          <p:nvPr/>
+        </p:nvPicPr>
+        <p:blipFill>
+          <a:blip r:embed="rId3">
+            <a:extLst>
+              <a:ext uri="{28A0092B-C50C-407E-A947-70E740481C1C}">
+                <a14:useLocalDpi xmlns:a14="http://schemas.microsoft.com/office/drawing/2010/main" val="0"/>
+              </a:ext>
+            </a:extLst>
+          </a:blip>
+          <a:srcRect/>
+          <a:stretch/>
+        </p:blipFill>
+        <p:spPr>
+          <a:xfrm>
+            <a:off x="1017766" y="4608571"/>
+            <a:ext cx="4498857" cy="4498857"/>
+          </a:xfrm>
+          <a:prstGeom prst="rect">
+            <a:avLst/>
+          </a:prstGeom>
+        </p:spPr>
+      </p:pic>
+      <p:pic>
+        <p:nvPicPr>
+          <p:cNvPr id="12" name="Picture 11">
+            <a:extLst>
+              <a:ext uri="{FF2B5EF4-FFF2-40B4-BE49-F238E27FC236}">
+                <a16:creationId xmlns:a16="http://schemas.microsoft.com/office/drawing/2014/main" id="{5C2D15B8-CD11-2790-0BF0-AE3F89EE82ED}"/>
+              </a:ext>
+            </a:extLst>
+          </p:cNvPr>
+          <p:cNvPicPr>
+            <a:picLocks noChangeAspect="1"/>
+          </p:cNvPicPr>
+          <p:nvPr/>
+        </p:nvPicPr>
+        <p:blipFill>
+          <a:blip r:embed="rId4">
+            <a:extLst>
+              <a:ext uri="{28A0092B-C50C-407E-A947-70E740481C1C}">
+                <a14:useLocalDpi xmlns:a14="http://schemas.microsoft.com/office/drawing/2010/main" val="0"/>
+              </a:ext>
+            </a:extLst>
+          </a:blip>
+          <a:srcRect/>
+          <a:stretch/>
+        </p:blipFill>
+        <p:spPr>
+          <a:xfrm>
+            <a:off x="5516624" y="114096"/>
+            <a:ext cx="4498857" cy="4498857"/>
+          </a:xfrm>
+          <a:prstGeom prst="rect">
+            <a:avLst/>
+          </a:prstGeom>
+        </p:spPr>
+      </p:pic>
+      <p:pic>
+        <p:nvPicPr>
+          <p:cNvPr id="3" name="Picture 2" descr="A graph of a graph showing the number of molecules&#10;&#10;Description automatically generated">
+            <a:extLst>
+              <a:ext uri="{FF2B5EF4-FFF2-40B4-BE49-F238E27FC236}">
+                <a16:creationId xmlns:a16="http://schemas.microsoft.com/office/drawing/2014/main" id="{62DABAC0-8AC2-59C2-B10D-0D02EF73AD86}"/>
+              </a:ext>
+            </a:extLst>
+          </p:cNvPr>
+          <p:cNvPicPr>
+            <a:picLocks noChangeAspect="1"/>
+          </p:cNvPicPr>
+          <p:nvPr/>
+        </p:nvPicPr>
+        <p:blipFill>
+          <a:blip r:embed="rId5">
+            <a:extLst>
+              <a:ext uri="{28A0092B-C50C-407E-A947-70E740481C1C}">
+                <a14:useLocalDpi xmlns:a14="http://schemas.microsoft.com/office/drawing/2010/main" val="0"/>
+              </a:ext>
+            </a:extLst>
+          </a:blip>
+          <a:stretch>
+            <a:fillRect/>
+          </a:stretch>
+        </p:blipFill>
+        <p:spPr>
+          <a:xfrm>
+            <a:off x="5516623" y="4608571"/>
+            <a:ext cx="4498857" cy="4498857"/>
+          </a:xfrm>
+          <a:prstGeom prst="rect">
+            <a:avLst/>
+          </a:prstGeom>
+        </p:spPr>
+      </p:pic>
+    </p:spTree>
+    <p:extLst>
+      <p:ext uri="{BB962C8B-B14F-4D97-AF65-F5344CB8AC3E}">
+        <p14:creationId xmlns:p14="http://schemas.microsoft.com/office/powerpoint/2010/main" val="3364617500"/>
+      </p:ext>
+    </p:extLst>
+  </p:cSld>
+  <p:clrMapOvr>
+    <a:masterClrMapping/>
+  </p:clrMapOvr>
+</p:sld>
+</file>
+
+<file path=ppt/slides/slide8.xml><?xml version="1.0" encoding="utf-8"?>
+<p:sld xmlns:a="http://schemas.openxmlformats.org/drawingml/2006/main" xmlns:r="http://schemas.openxmlformats.org/officeDocument/2006/relationships" xmlns:p="http://schemas.openxmlformats.org/presentationml/2006/main">
+  <p:cSld>
+    <p:spTree>
+      <p:nvGrpSpPr>
+        <p:cNvPr id="1" name=""/>
+        <p:cNvGrpSpPr/>
+        <p:nvPr/>
+      </p:nvGrpSpPr>
+      <p:grpSpPr>
+        <a:xfrm>
+          <a:off x="0" y="0"/>
+          <a:ext cx="0" cy="0"/>
+          <a:chOff x="0" y="0"/>
+          <a:chExt cx="0" cy="0"/>
+        </a:xfrm>
+      </p:grpSpPr>
+      <p:pic>
+        <p:nvPicPr>
+          <p:cNvPr id="12" name="Picture 11">
+            <a:extLst>
+              <a:ext uri="{FF2B5EF4-FFF2-40B4-BE49-F238E27FC236}">
+                <a16:creationId xmlns:a16="http://schemas.microsoft.com/office/drawing/2014/main" id="{24315EBD-2644-B7F5-A45B-A4DD6CE95DA9}"/>
+              </a:ext>
+            </a:extLst>
+          </p:cNvPr>
+          <p:cNvPicPr>
+            <a:picLocks noChangeAspect="1"/>
+          </p:cNvPicPr>
+          <p:nvPr/>
+        </p:nvPicPr>
+        <p:blipFill>
+          <a:blip r:embed="rId2"/>
+          <a:stretch>
+            <a:fillRect/>
+          </a:stretch>
+        </p:blipFill>
+        <p:spPr>
+          <a:xfrm>
+            <a:off x="2669321" y="0"/>
+            <a:ext cx="6853357" cy="6858000"/>
+          </a:xfrm>
+          <a:prstGeom prst="rect">
+            <a:avLst/>
+          </a:prstGeom>
+        </p:spPr>
+      </p:pic>
+    </p:spTree>
+    <p:extLst>
+      <p:ext uri="{BB962C8B-B14F-4D97-AF65-F5344CB8AC3E}">
+        <p14:creationId xmlns:p14="http://schemas.microsoft.com/office/powerpoint/2010/main" val="3565059735"/>
+      </p:ext>
+    </p:extLst>
+  </p:cSld>
+  <p:clrMapOvr>
+    <a:masterClrMapping/>
+  </p:clrMapOvr>
+</p:sld>
+</file>
+
+<file path=ppt/slides/slide9.xml><?xml version="1.0" encoding="utf-8"?>
+<p:sld xmlns:a="http://schemas.openxmlformats.org/drawingml/2006/main" xmlns:r="http://schemas.openxmlformats.org/officeDocument/2006/relationships" xmlns:p="http://schemas.openxmlformats.org/presentationml/2006/main">
+  <p:cSld>
+    <p:spTree>
+      <p:nvGrpSpPr>
+        <p:cNvPr id="1" name=""/>
+        <p:cNvGrpSpPr/>
+        <p:nvPr/>
+      </p:nvGrpSpPr>
+      <p:grpSpPr>
+        <a:xfrm>
+          <a:off x="0" y="0"/>
+          <a:ext cx="0" cy="0"/>
+          <a:chOff x="0" y="0"/>
+          <a:chExt cx="0" cy="0"/>
+        </a:xfrm>
+      </p:grpSpPr>
+      <p:pic>
+        <p:nvPicPr>
+          <p:cNvPr id="3" name="Picture 2">
+            <a:extLst>
+              <a:ext uri="{FF2B5EF4-FFF2-40B4-BE49-F238E27FC236}">
+                <a16:creationId xmlns:a16="http://schemas.microsoft.com/office/drawing/2014/main" id="{5C25C47E-A865-A116-9492-374DBAC738E1}"/>
+              </a:ext>
+            </a:extLst>
+          </p:cNvPr>
+          <p:cNvPicPr>
+            <a:picLocks noChangeAspect="1"/>
+          </p:cNvPicPr>
+          <p:nvPr/>
+        </p:nvPicPr>
+        <p:blipFill>
+          <a:blip r:embed="rId2">
+            <a:extLst>
+              <a:ext uri="{28A0092B-C50C-407E-A947-70E740481C1C}">
+                <a14:useLocalDpi xmlns:a14="http://schemas.microsoft.com/office/drawing/2010/main" val="0"/>
+              </a:ext>
+            </a:extLst>
+          </a:blip>
+          <a:srcRect/>
+          <a:stretch/>
+        </p:blipFill>
+        <p:spPr>
+          <a:xfrm>
+            <a:off x="2011922" y="3008371"/>
+            <a:ext cx="8997714" cy="4498857"/>
+          </a:xfrm>
+          <a:prstGeom prst="rect">
+            <a:avLst/>
+          </a:prstGeom>
+        </p:spPr>
+      </p:pic>
+      <p:pic>
+        <p:nvPicPr>
+          <p:cNvPr id="6" name="Picture 5">
+            <a:extLst>
+              <a:ext uri="{FF2B5EF4-FFF2-40B4-BE49-F238E27FC236}">
+                <a16:creationId xmlns:a16="http://schemas.microsoft.com/office/drawing/2014/main" id="{7CA9AA40-C72A-A3CD-EBDA-66778A9564D0}"/>
+              </a:ext>
+            </a:extLst>
+          </p:cNvPr>
+          <p:cNvPicPr>
+            <a:picLocks noChangeAspect="1"/>
+          </p:cNvPicPr>
+          <p:nvPr/>
+        </p:nvPicPr>
+        <p:blipFill>
+          <a:blip r:embed="rId3">
+            <a:extLst>
+              <a:ext uri="{28A0092B-C50C-407E-A947-70E740481C1C}">
+                <a14:useLocalDpi xmlns:a14="http://schemas.microsoft.com/office/drawing/2010/main" val="0"/>
+              </a:ext>
+            </a:extLst>
+          </a:blip>
+          <a:srcRect/>
+          <a:stretch/>
+        </p:blipFill>
+        <p:spPr>
+          <a:xfrm>
+            <a:off x="2011922" y="-1490486"/>
+            <a:ext cx="4498857" cy="4498857"/>
+          </a:xfrm>
+          <a:prstGeom prst="rect">
+            <a:avLst/>
+          </a:prstGeom>
+        </p:spPr>
+      </p:pic>
+      <p:pic>
+        <p:nvPicPr>
+          <p:cNvPr id="9" name="Picture 8">
+            <a:extLst>
+              <a:ext uri="{FF2B5EF4-FFF2-40B4-BE49-F238E27FC236}">
+                <a16:creationId xmlns:a16="http://schemas.microsoft.com/office/drawing/2014/main" id="{BF29CF53-7B7E-62B6-D30B-218FA9FE583D}"/>
+              </a:ext>
+            </a:extLst>
+          </p:cNvPr>
+          <p:cNvPicPr>
+            <a:picLocks noChangeAspect="1"/>
+          </p:cNvPicPr>
+          <p:nvPr/>
+        </p:nvPicPr>
+        <p:blipFill>
+          <a:blip r:embed="rId4">
+            <a:extLst>
+              <a:ext uri="{28A0092B-C50C-407E-A947-70E740481C1C}">
+                <a14:useLocalDpi xmlns:a14="http://schemas.microsoft.com/office/drawing/2010/main" val="0"/>
+              </a:ext>
+            </a:extLst>
+          </a:blip>
+          <a:srcRect/>
+          <a:stretch/>
+        </p:blipFill>
+        <p:spPr>
+          <a:xfrm>
+            <a:off x="6510779" y="-1490486"/>
+            <a:ext cx="4498857" cy="4498857"/>
+          </a:xfrm>
+          <a:prstGeom prst="rect">
+            <a:avLst/>
+          </a:prstGeom>
+        </p:spPr>
+      </p:pic>
+    </p:spTree>
+    <p:extLst>
+      <p:ext uri="{BB962C8B-B14F-4D97-AF65-F5344CB8AC3E}">
+        <p14:creationId xmlns:p14="http://schemas.microsoft.com/office/powerpoint/2010/main" val="3905823268"/>
       </p:ext>
     </p:extLst>
   </p:cSld>

</xml_diff>